<commit_message>
public bot on heroku
</commit_message>
<xml_diff>
--- a/Детективы.pptx
+++ b/Детективы.pptx
@@ -5801,6 +5801,14 @@
   <p:clrMapOvr>
     <a:masterClrMapping/>
   </p:clrMapOvr>
+  <mc:AlternateContent xmlns:mc="http://schemas.openxmlformats.org/markup-compatibility/2006">
+    <mc:Choice xmlns:p14="http://schemas.microsoft.com/office/powerpoint/2010/main" Requires="p14">
+      <p:transition spd="slow" p14:dur="2000"/>
+    </mc:Choice>
+    <mc:Fallback>
+      <p:transition spd="slow"/>
+    </mc:Fallback>
+  </mc:AlternateContent>
   <p:timing>
     <p:tnLst>
       <p:par>
@@ -5956,6 +5964,14 @@
   <p:clrMapOvr>
     <a:masterClrMapping/>
   </p:clrMapOvr>
+  <mc:AlternateContent xmlns:mc="http://schemas.openxmlformats.org/markup-compatibility/2006">
+    <mc:Choice xmlns:p14="http://schemas.microsoft.com/office/powerpoint/2010/main" Requires="p14">
+      <p:transition spd="slow" p14:dur="2000"/>
+    </mc:Choice>
+    <mc:Fallback>
+      <p:transition spd="slow"/>
+    </mc:Fallback>
+  </mc:AlternateContent>
   <p:timing>
     <p:tnLst>
       <p:par>
@@ -6062,6 +6078,14 @@
   <p:clrMapOvr>
     <a:masterClrMapping/>
   </p:clrMapOvr>
+  <mc:AlternateContent xmlns:mc="http://schemas.openxmlformats.org/markup-compatibility/2006">
+    <mc:Choice xmlns:p14="http://schemas.microsoft.com/office/powerpoint/2010/main" Requires="p14">
+      <p:transition spd="slow" p14:dur="2000"/>
+    </mc:Choice>
+    <mc:Fallback>
+      <p:transition spd="slow"/>
+    </mc:Fallback>
+  </mc:AlternateContent>
   <p:timing>
     <p:tnLst>
       <p:par>
@@ -6110,7 +6134,7 @@
           <a:lstStyle/>
           <a:p>
             <a:r>
-              <a:rPr lang="ru-RU" dirty="0" err="1"/>
+              <a:rPr lang="ru-RU" dirty="0" err="1" smtClean="0"/>
               <a:t>Яндекс.детектив</a:t>
             </a:r>
             <a:endParaRPr lang="ru-RU" dirty="0"/>
@@ -6267,6 +6291,14 @@
   <p:clrMapOvr>
     <a:masterClrMapping/>
   </p:clrMapOvr>
+  <mc:AlternateContent xmlns:mc="http://schemas.openxmlformats.org/markup-compatibility/2006">
+    <mc:Choice xmlns:p14="http://schemas.microsoft.com/office/powerpoint/2010/main" Requires="p14">
+      <p:transition spd="slow" p14:dur="2000"/>
+    </mc:Choice>
+    <mc:Fallback>
+      <p:transition spd="slow"/>
+    </mc:Fallback>
+  </mc:AlternateContent>
   <p:timing>
     <p:tnLst>
       <p:par>
@@ -6356,6 +6388,14 @@
   <p:clrMapOvr>
     <a:masterClrMapping/>
   </p:clrMapOvr>
+  <mc:AlternateContent xmlns:mc="http://schemas.openxmlformats.org/markup-compatibility/2006">
+    <mc:Choice xmlns:p14="http://schemas.microsoft.com/office/powerpoint/2010/main" Requires="p14">
+      <p:transition spd="slow" p14:dur="2000"/>
+    </mc:Choice>
+    <mc:Fallback>
+      <p:transition spd="slow"/>
+    </mc:Fallback>
+  </mc:AlternateContent>
   <p:timing>
     <p:tnLst>
       <p:par>
@@ -6445,6 +6485,14 @@
   <p:clrMapOvr>
     <a:masterClrMapping/>
   </p:clrMapOvr>
+  <mc:AlternateContent xmlns:mc="http://schemas.openxmlformats.org/markup-compatibility/2006">
+    <mc:Choice xmlns:p14="http://schemas.microsoft.com/office/powerpoint/2010/main" Requires="p14">
+      <p:transition spd="slow" p14:dur="2000"/>
+    </mc:Choice>
+    <mc:Fallback>
+      <p:transition spd="slow"/>
+    </mc:Fallback>
+  </mc:AlternateContent>
   <p:timing>
     <p:tnLst>
       <p:par>
@@ -6509,7 +6557,7 @@
         <p:spPr>
           <a:xfrm>
             <a:off x="1422401" y="1154546"/>
-            <a:ext cx="9827489" cy="5632311"/>
+            <a:ext cx="9827489" cy="5078313"/>
           </a:xfrm>
           <a:prstGeom prst="rect">
             <a:avLst/>
@@ -6611,13 +6659,13 @@
               <a:t>Для этого можно использовать </a:t>
             </a:r>
             <a:r>
-              <a:rPr lang="en-US" sz="3600" dirty="0" err="1" smtClean="0">
+              <a:rPr lang="ru-RU" sz="3600" dirty="0" smtClean="0">
                 <a:solidFill>
                   <a:schemeClr val="tx2"/>
                 </a:solidFill>
                 <a:latin typeface="-apple-system"/>
               </a:rPr>
-              <a:t>MapAPI</a:t>
+              <a:t>различные </a:t>
             </a:r>
             <a:r>
               <a:rPr lang="en-US" sz="3600" dirty="0" smtClean="0">
@@ -6626,53 +6674,14 @@
                 </a:solidFill>
                 <a:latin typeface="-apple-system"/>
               </a:rPr>
-              <a:t>, </a:t>
-            </a:r>
-            <a:r>
-              <a:rPr lang="en-US" sz="3600" dirty="0" err="1" smtClean="0">
-                <a:solidFill>
-                  <a:schemeClr val="tx2"/>
-                </a:solidFill>
-                <a:latin typeface="-apple-system"/>
-              </a:rPr>
-              <a:t>QRCode</a:t>
-            </a:r>
-            <a:r>
-              <a:rPr lang="en-US" sz="3600" dirty="0" smtClean="0">
-                <a:solidFill>
-                  <a:schemeClr val="tx2"/>
-                </a:solidFill>
-                <a:latin typeface="-apple-system"/>
-              </a:rPr>
-              <a:t> API, </a:t>
-            </a:r>
-            <a:r>
-              <a:rPr lang="en-US" sz="3600" dirty="0" err="1" smtClean="0">
-                <a:solidFill>
-                  <a:schemeClr val="tx2"/>
-                </a:solidFill>
-                <a:latin typeface="-apple-system"/>
-              </a:rPr>
-              <a:t>TranslateAPI</a:t>
-            </a:r>
-            <a:r>
-              <a:rPr lang="en-US" sz="3600" dirty="0" smtClean="0">
-                <a:solidFill>
-                  <a:schemeClr val="tx2"/>
-                </a:solidFill>
-                <a:latin typeface="-apple-system"/>
-              </a:rPr>
-              <a:t>, API </a:t>
-            </a:r>
-            <a:r>
-              <a:rPr lang="ru-RU" sz="3600" dirty="0" smtClean="0">
-                <a:solidFill>
-                  <a:schemeClr val="tx2"/>
-                </a:solidFill>
-                <a:latin typeface="-apple-system"/>
-              </a:rPr>
-              <a:t>Яндекс Погоды</a:t>
-            </a:r>
+              <a:t>API</a:t>
+            </a:r>
+            <a:endParaRPr lang="ru-RU" sz="3600" dirty="0" smtClean="0">
+              <a:solidFill>
+                <a:schemeClr val="tx2"/>
+              </a:solidFill>
+              <a:latin typeface="-apple-system"/>
+            </a:endParaRPr>
           </a:p>
         </p:txBody>
       </p:sp>
@@ -6686,6 +6695,14 @@
   <p:clrMapOvr>
     <a:masterClrMapping/>
   </p:clrMapOvr>
+  <mc:AlternateContent xmlns:mc="http://schemas.openxmlformats.org/markup-compatibility/2006">
+    <mc:Choice xmlns:p14="http://schemas.microsoft.com/office/powerpoint/2010/main" Requires="p14">
+      <p:transition spd="slow" p14:dur="2000"/>
+    </mc:Choice>
+    <mc:Fallback>
+      <p:transition spd="slow"/>
+    </mc:Fallback>
+  </mc:AlternateContent>
   <p:timing>
     <p:tnLst>
       <p:par>
@@ -6933,6 +6950,14 @@
   <p:clrMapOvr>
     <a:masterClrMapping/>
   </p:clrMapOvr>
+  <mc:AlternateContent xmlns:mc="http://schemas.openxmlformats.org/markup-compatibility/2006">
+    <mc:Choice xmlns:p14="http://schemas.microsoft.com/office/powerpoint/2010/main" Requires="p14">
+      <p:transition spd="slow" p14:dur="2000"/>
+    </mc:Choice>
+    <mc:Fallback>
+      <p:transition spd="slow"/>
+    </mc:Fallback>
+  </mc:AlternateContent>
   <p:timing>
     <p:tnLst>
       <p:par>
@@ -7108,6 +7133,14 @@
   <p:clrMapOvr>
     <a:masterClrMapping/>
   </p:clrMapOvr>
+  <mc:AlternateContent xmlns:mc="http://schemas.openxmlformats.org/markup-compatibility/2006">
+    <mc:Choice xmlns:p14="http://schemas.microsoft.com/office/powerpoint/2010/main" Requires="p14">
+      <p:transition spd="slow" p14:dur="2000"/>
+    </mc:Choice>
+    <mc:Fallback>
+      <p:transition spd="slow"/>
+    </mc:Fallback>
+  </mc:AlternateContent>
   <p:timing>
     <p:tnLst>
       <p:par>
@@ -7293,6 +7326,14 @@
   <p:clrMapOvr>
     <a:masterClrMapping/>
   </p:clrMapOvr>
+  <mc:AlternateContent xmlns:mc="http://schemas.openxmlformats.org/markup-compatibility/2006">
+    <mc:Choice xmlns:p14="http://schemas.microsoft.com/office/powerpoint/2010/main" Requires="p14">
+      <p:transition spd="slow" p14:dur="2000"/>
+    </mc:Choice>
+    <mc:Fallback>
+      <p:transition spd="slow"/>
+    </mc:Fallback>
+  </mc:AlternateContent>
   <p:timing>
     <p:tnLst>
       <p:par>
@@ -7482,6 +7523,14 @@
   <p:clrMapOvr>
     <a:masterClrMapping/>
   </p:clrMapOvr>
+  <mc:AlternateContent xmlns:mc="http://schemas.openxmlformats.org/markup-compatibility/2006">
+    <mc:Choice xmlns:p14="http://schemas.microsoft.com/office/powerpoint/2010/main" Requires="p14">
+      <p:transition spd="slow" p14:dur="2000"/>
+    </mc:Choice>
+    <mc:Fallback>
+      <p:transition spd="slow"/>
+    </mc:Fallback>
+  </mc:AlternateContent>
   <p:timing>
     <p:tnLst>
       <p:par>

</xml_diff>